<commit_message>
Static targets; intro to consistency checks
</commit_message>
<xml_diff>
--- a/Images/Language/- Check Marbles.pptx
+++ b/Images/Language/- Check Marbles.pptx
@@ -8,6 +8,7 @@
     <p:sldId id="256" r:id="rId2"/>
     <p:sldId id="258" r:id="rId3"/>
     <p:sldId id="259" r:id="rId4"/>
+    <p:sldId id="260" r:id="rId5"/>
   </p:sldIdLst>
   <p:sldSz cx="12192000" cy="10607675"/>
   <p:notesSz cx="6858000" cy="9144000"/>
@@ -245,7 +246,7 @@
           <a:p>
             <a:fld id="{05D01D5D-DC78-4E2E-9424-7F260C4864BB}" type="datetimeFigureOut">
               <a:rPr lang="en-US" smtClean="0"/>
-              <a:t>02-Jun-16</a:t>
+              <a:t>04-Jun-16</a:t>
             </a:fld>
             <a:endParaRPr lang="en-US"/>
           </a:p>
@@ -415,7 +416,7 @@
           <a:p>
             <a:fld id="{05D01D5D-DC78-4E2E-9424-7F260C4864BB}" type="datetimeFigureOut">
               <a:rPr lang="en-US" smtClean="0"/>
-              <a:t>02-Jun-16</a:t>
+              <a:t>04-Jun-16</a:t>
             </a:fld>
             <a:endParaRPr lang="en-US"/>
           </a:p>
@@ -595,7 +596,7 @@
           <a:p>
             <a:fld id="{05D01D5D-DC78-4E2E-9424-7F260C4864BB}" type="datetimeFigureOut">
               <a:rPr lang="en-US" smtClean="0"/>
-              <a:t>02-Jun-16</a:t>
+              <a:t>04-Jun-16</a:t>
             </a:fld>
             <a:endParaRPr lang="en-US"/>
           </a:p>
@@ -765,7 +766,7 @@
           <a:p>
             <a:fld id="{05D01D5D-DC78-4E2E-9424-7F260C4864BB}" type="datetimeFigureOut">
               <a:rPr lang="en-US" smtClean="0"/>
-              <a:t>02-Jun-16</a:t>
+              <a:t>04-Jun-16</a:t>
             </a:fld>
             <a:endParaRPr lang="en-US"/>
           </a:p>
@@ -1009,7 +1010,7 @@
           <a:p>
             <a:fld id="{05D01D5D-DC78-4E2E-9424-7F260C4864BB}" type="datetimeFigureOut">
               <a:rPr lang="en-US" smtClean="0"/>
-              <a:t>02-Jun-16</a:t>
+              <a:t>04-Jun-16</a:t>
             </a:fld>
             <a:endParaRPr lang="en-US"/>
           </a:p>
@@ -1241,7 +1242,7 @@
           <a:p>
             <a:fld id="{05D01D5D-DC78-4E2E-9424-7F260C4864BB}" type="datetimeFigureOut">
               <a:rPr lang="en-US" smtClean="0"/>
-              <a:t>02-Jun-16</a:t>
+              <a:t>04-Jun-16</a:t>
             </a:fld>
             <a:endParaRPr lang="en-US"/>
           </a:p>
@@ -1608,7 +1609,7 @@
           <a:p>
             <a:fld id="{05D01D5D-DC78-4E2E-9424-7F260C4864BB}" type="datetimeFigureOut">
               <a:rPr lang="en-US" smtClean="0"/>
-              <a:t>02-Jun-16</a:t>
+              <a:t>04-Jun-16</a:t>
             </a:fld>
             <a:endParaRPr lang="en-US"/>
           </a:p>
@@ -1726,7 +1727,7 @@
           <a:p>
             <a:fld id="{05D01D5D-DC78-4E2E-9424-7F260C4864BB}" type="datetimeFigureOut">
               <a:rPr lang="en-US" smtClean="0"/>
-              <a:t>02-Jun-16</a:t>
+              <a:t>04-Jun-16</a:t>
             </a:fld>
             <a:endParaRPr lang="en-US"/>
           </a:p>
@@ -1821,7 +1822,7 @@
           <a:p>
             <a:fld id="{05D01D5D-DC78-4E2E-9424-7F260C4864BB}" type="datetimeFigureOut">
               <a:rPr lang="en-US" smtClean="0"/>
-              <a:t>02-Jun-16</a:t>
+              <a:t>04-Jun-16</a:t>
             </a:fld>
             <a:endParaRPr lang="en-US"/>
           </a:p>
@@ -2098,7 +2099,7 @@
           <a:p>
             <a:fld id="{05D01D5D-DC78-4E2E-9424-7F260C4864BB}" type="datetimeFigureOut">
               <a:rPr lang="en-US" smtClean="0"/>
-              <a:t>02-Jun-16</a:t>
+              <a:t>04-Jun-16</a:t>
             </a:fld>
             <a:endParaRPr lang="en-US"/>
           </a:p>
@@ -2355,7 +2356,7 @@
           <a:p>
             <a:fld id="{05D01D5D-DC78-4E2E-9424-7F260C4864BB}" type="datetimeFigureOut">
               <a:rPr lang="en-US" smtClean="0"/>
-              <a:t>02-Jun-16</a:t>
+              <a:t>04-Jun-16</a:t>
             </a:fld>
             <a:endParaRPr lang="en-US"/>
           </a:p>
@@ -2568,7 +2569,7 @@
           <a:p>
             <a:fld id="{05D01D5D-DC78-4E2E-9424-7F260C4864BB}" type="datetimeFigureOut">
               <a:rPr lang="en-US" smtClean="0"/>
-              <a:t>02-Jun-16</a:t>
+              <a:t>04-Jun-16</a:t>
             </a:fld>
             <a:endParaRPr lang="en-US"/>
           </a:p>
@@ -5708,11 +5709,6 @@
               </a:rPr>
               <a:t>Success</a:t>
             </a:r>
-            <a:endParaRPr lang="en-US" dirty="0">
-              <a:solidFill>
-                <a:schemeClr val="tx1"/>
-              </a:solidFill>
-            </a:endParaRPr>
           </a:p>
         </p:txBody>
       </p:sp>
@@ -8172,6 +8168,682 @@
     <p:extLst>
       <p:ext uri="{BB962C8B-B14F-4D97-AF65-F5344CB8AC3E}">
         <p14:creationId xmlns:p14="http://schemas.microsoft.com/office/powerpoint/2010/main" val="3191924816"/>
+      </p:ext>
+    </p:extLst>
+  </p:cSld>
+  <p:clrMapOvr>
+    <a:masterClrMapping/>
+  </p:clrMapOvr>
+</p:sld>
+</file>
+
+<file path=ppt/slides/slide4.xml><?xml version="1.0" encoding="utf-8"?>
+<p:sld xmlns:a="http://schemas.openxmlformats.org/drawingml/2006/main" xmlns:r="http://schemas.openxmlformats.org/officeDocument/2006/relationships" xmlns:p="http://schemas.openxmlformats.org/presentationml/2006/main">
+  <p:cSld>
+    <p:spTree>
+      <p:nvGrpSpPr>
+        <p:cNvPr id="1" name=""/>
+        <p:cNvGrpSpPr/>
+        <p:nvPr/>
+      </p:nvGrpSpPr>
+      <p:grpSpPr>
+        <a:xfrm>
+          <a:off x="0" y="0"/>
+          <a:ext cx="0" cy="0"/>
+          <a:chOff x="0" y="0"/>
+          <a:chExt cx="0" cy="0"/>
+        </a:xfrm>
+      </p:grpSpPr>
+      <p:sp>
+        <p:nvSpPr>
+          <p:cNvPr id="13" name="Rectangle 12"/>
+          <p:cNvSpPr/>
+          <p:nvPr/>
+        </p:nvSpPr>
+        <p:spPr>
+          <a:xfrm>
+            <a:off x="1454996" y="416369"/>
+            <a:ext cx="1229360" cy="457200"/>
+          </a:xfrm>
+          <a:prstGeom prst="rect">
+            <a:avLst/>
+          </a:prstGeom>
+          <a:solidFill>
+            <a:srgbClr val="00B050"/>
+          </a:solidFill>
+          <a:ln w="28575">
+            <a:solidFill>
+              <a:schemeClr val="tx1"/>
+            </a:solidFill>
+          </a:ln>
+        </p:spPr>
+        <p:style>
+          <a:lnRef idx="2">
+            <a:schemeClr val="accent1">
+              <a:shade val="50000"/>
+            </a:schemeClr>
+          </a:lnRef>
+          <a:fillRef idx="1">
+            <a:schemeClr val="accent1"/>
+          </a:fillRef>
+          <a:effectRef idx="0">
+            <a:schemeClr val="accent1"/>
+          </a:effectRef>
+          <a:fontRef idx="minor">
+            <a:schemeClr val="lt1"/>
+          </a:fontRef>
+        </p:style>
+        <p:txBody>
+          <a:bodyPr rtlCol="0" anchor="ctr"/>
+          <a:lstStyle/>
+          <a:p>
+            <a:pPr algn="ctr"/>
+            <a:r>
+              <a:rPr lang="en-US" dirty="0">
+                <a:solidFill>
+                  <a:schemeClr val="tx1"/>
+                </a:solidFill>
+              </a:rPr>
+              <a:t>Success</a:t>
+            </a:r>
+          </a:p>
+        </p:txBody>
+      </p:sp>
+      <p:sp>
+        <p:nvSpPr>
+          <p:cNvPr id="29" name="Rectangle 28"/>
+          <p:cNvSpPr/>
+          <p:nvPr/>
+        </p:nvSpPr>
+        <p:spPr>
+          <a:xfrm>
+            <a:off x="1454996" y="1225994"/>
+            <a:ext cx="1229360" cy="457200"/>
+          </a:xfrm>
+          <a:prstGeom prst="rect">
+            <a:avLst/>
+          </a:prstGeom>
+          <a:solidFill>
+            <a:srgbClr val="00B050"/>
+          </a:solidFill>
+          <a:ln w="28575">
+            <a:solidFill>
+              <a:schemeClr val="tx1"/>
+            </a:solidFill>
+          </a:ln>
+        </p:spPr>
+        <p:style>
+          <a:lnRef idx="2">
+            <a:schemeClr val="accent1">
+              <a:shade val="50000"/>
+            </a:schemeClr>
+          </a:lnRef>
+          <a:fillRef idx="1">
+            <a:schemeClr val="accent1"/>
+          </a:fillRef>
+          <a:effectRef idx="0">
+            <a:schemeClr val="accent1"/>
+          </a:effectRef>
+          <a:fontRef idx="minor">
+            <a:schemeClr val="lt1"/>
+          </a:fontRef>
+        </p:style>
+        <p:txBody>
+          <a:bodyPr rtlCol="0" anchor="ctr"/>
+          <a:lstStyle/>
+          <a:p>
+            <a:pPr algn="ctr"/>
+            <a:r>
+              <a:rPr lang="en-US" dirty="0">
+                <a:solidFill>
+                  <a:schemeClr val="tx1"/>
+                </a:solidFill>
+              </a:rPr>
+              <a:t>Success</a:t>
+            </a:r>
+          </a:p>
+        </p:txBody>
+      </p:sp>
+      <p:sp>
+        <p:nvSpPr>
+          <p:cNvPr id="30" name="Rectangle 29"/>
+          <p:cNvSpPr/>
+          <p:nvPr/>
+        </p:nvSpPr>
+        <p:spPr>
+          <a:xfrm>
+            <a:off x="1454996" y="2035619"/>
+            <a:ext cx="1229360" cy="457200"/>
+          </a:xfrm>
+          <a:prstGeom prst="rect">
+            <a:avLst/>
+          </a:prstGeom>
+          <a:solidFill>
+            <a:srgbClr val="00B050"/>
+          </a:solidFill>
+          <a:ln w="28575">
+            <a:solidFill>
+              <a:schemeClr val="tx1"/>
+            </a:solidFill>
+          </a:ln>
+        </p:spPr>
+        <p:style>
+          <a:lnRef idx="2">
+            <a:schemeClr val="accent1">
+              <a:shade val="50000"/>
+            </a:schemeClr>
+          </a:lnRef>
+          <a:fillRef idx="1">
+            <a:schemeClr val="accent1"/>
+          </a:fillRef>
+          <a:effectRef idx="0">
+            <a:schemeClr val="accent1"/>
+          </a:effectRef>
+          <a:fontRef idx="minor">
+            <a:schemeClr val="lt1"/>
+          </a:fontRef>
+        </p:style>
+        <p:txBody>
+          <a:bodyPr rtlCol="0" anchor="ctr"/>
+          <a:lstStyle/>
+          <a:p>
+            <a:pPr algn="ctr"/>
+            <a:r>
+              <a:rPr lang="en-US" dirty="0">
+                <a:solidFill>
+                  <a:schemeClr val="tx1"/>
+                </a:solidFill>
+              </a:rPr>
+              <a:t>Success</a:t>
+            </a:r>
+          </a:p>
+        </p:txBody>
+      </p:sp>
+      <p:sp>
+        <p:nvSpPr>
+          <p:cNvPr id="31" name="Rectangle 30"/>
+          <p:cNvSpPr/>
+          <p:nvPr/>
+        </p:nvSpPr>
+        <p:spPr>
+          <a:xfrm>
+            <a:off x="1468966" y="2845244"/>
+            <a:ext cx="1229360" cy="457200"/>
+          </a:xfrm>
+          <a:prstGeom prst="rect">
+            <a:avLst/>
+          </a:prstGeom>
+          <a:solidFill>
+            <a:srgbClr val="00B050"/>
+          </a:solidFill>
+          <a:ln w="28575">
+            <a:solidFill>
+              <a:schemeClr val="tx1"/>
+            </a:solidFill>
+          </a:ln>
+        </p:spPr>
+        <p:style>
+          <a:lnRef idx="2">
+            <a:schemeClr val="accent1">
+              <a:shade val="50000"/>
+            </a:schemeClr>
+          </a:lnRef>
+          <a:fillRef idx="1">
+            <a:schemeClr val="accent1"/>
+          </a:fillRef>
+          <a:effectRef idx="0">
+            <a:schemeClr val="accent1"/>
+          </a:effectRef>
+          <a:fontRef idx="minor">
+            <a:schemeClr val="lt1"/>
+          </a:fontRef>
+        </p:style>
+        <p:txBody>
+          <a:bodyPr rtlCol="0" anchor="ctr"/>
+          <a:lstStyle/>
+          <a:p>
+            <a:pPr algn="ctr"/>
+            <a:r>
+              <a:rPr lang="en-US" dirty="0">
+                <a:solidFill>
+                  <a:schemeClr val="tx1"/>
+                </a:solidFill>
+              </a:rPr>
+              <a:t>Success</a:t>
+            </a:r>
+          </a:p>
+        </p:txBody>
+      </p:sp>
+      <p:sp>
+        <p:nvSpPr>
+          <p:cNvPr id="2" name="Right Brace 1"/>
+          <p:cNvSpPr/>
+          <p:nvPr/>
+        </p:nvSpPr>
+        <p:spPr>
+          <a:xfrm>
+            <a:off x="2956136" y="416369"/>
+            <a:ext cx="298450" cy="2886075"/>
+          </a:xfrm>
+          <a:prstGeom prst="rightBrace">
+            <a:avLst/>
+          </a:prstGeom>
+          <a:ln>
+            <a:solidFill>
+              <a:schemeClr val="tx1"/>
+            </a:solidFill>
+          </a:ln>
+        </p:spPr>
+        <p:style>
+          <a:lnRef idx="1">
+            <a:schemeClr val="accent1"/>
+          </a:lnRef>
+          <a:fillRef idx="0">
+            <a:schemeClr val="accent1"/>
+          </a:fillRef>
+          <a:effectRef idx="0">
+            <a:schemeClr val="accent1"/>
+          </a:effectRef>
+          <a:fontRef idx="minor">
+            <a:schemeClr val="tx1"/>
+          </a:fontRef>
+        </p:style>
+        <p:txBody>
+          <a:bodyPr rtlCol="0" anchor="ctr"/>
+          <a:lstStyle/>
+          <a:p>
+            <a:pPr algn="ctr"/>
+            <a:endParaRPr lang="en-US"/>
+          </a:p>
+        </p:txBody>
+      </p:sp>
+      <p:sp>
+        <p:nvSpPr>
+          <p:cNvPr id="32" name="Rectangle 31"/>
+          <p:cNvSpPr/>
+          <p:nvPr/>
+        </p:nvSpPr>
+        <p:spPr>
+          <a:xfrm>
+            <a:off x="3526366" y="1630806"/>
+            <a:ext cx="1229360" cy="457200"/>
+          </a:xfrm>
+          <a:prstGeom prst="rect">
+            <a:avLst/>
+          </a:prstGeom>
+          <a:solidFill>
+            <a:srgbClr val="00B050"/>
+          </a:solidFill>
+          <a:ln w="28575">
+            <a:solidFill>
+              <a:schemeClr val="tx1"/>
+            </a:solidFill>
+          </a:ln>
+        </p:spPr>
+        <p:style>
+          <a:lnRef idx="2">
+            <a:schemeClr val="accent1">
+              <a:shade val="50000"/>
+            </a:schemeClr>
+          </a:lnRef>
+          <a:fillRef idx="1">
+            <a:schemeClr val="accent1"/>
+          </a:fillRef>
+          <a:effectRef idx="0">
+            <a:schemeClr val="accent1"/>
+          </a:effectRef>
+          <a:fontRef idx="minor">
+            <a:schemeClr val="lt1"/>
+          </a:fontRef>
+        </p:style>
+        <p:txBody>
+          <a:bodyPr rtlCol="0" anchor="ctr"/>
+          <a:lstStyle/>
+          <a:p>
+            <a:pPr algn="ctr"/>
+            <a:r>
+              <a:rPr lang="en-US" dirty="0">
+                <a:solidFill>
+                  <a:schemeClr val="tx1"/>
+                </a:solidFill>
+              </a:rPr>
+              <a:t>Success</a:t>
+            </a:r>
+          </a:p>
+        </p:txBody>
+      </p:sp>
+      <p:sp>
+        <p:nvSpPr>
+          <p:cNvPr id="33" name="Rectangle 32"/>
+          <p:cNvSpPr/>
+          <p:nvPr/>
+        </p:nvSpPr>
+        <p:spPr>
+          <a:xfrm>
+            <a:off x="7553959" y="416369"/>
+            <a:ext cx="1229360" cy="457200"/>
+          </a:xfrm>
+          <a:prstGeom prst="rect">
+            <a:avLst/>
+          </a:prstGeom>
+          <a:solidFill>
+            <a:srgbClr val="00B050"/>
+          </a:solidFill>
+          <a:ln w="28575">
+            <a:solidFill>
+              <a:schemeClr val="tx1"/>
+            </a:solidFill>
+          </a:ln>
+        </p:spPr>
+        <p:style>
+          <a:lnRef idx="2">
+            <a:schemeClr val="accent1">
+              <a:shade val="50000"/>
+            </a:schemeClr>
+          </a:lnRef>
+          <a:fillRef idx="1">
+            <a:schemeClr val="accent1"/>
+          </a:fillRef>
+          <a:effectRef idx="0">
+            <a:schemeClr val="accent1"/>
+          </a:effectRef>
+          <a:fontRef idx="minor">
+            <a:schemeClr val="lt1"/>
+          </a:fontRef>
+        </p:style>
+        <p:txBody>
+          <a:bodyPr rtlCol="0" anchor="ctr"/>
+          <a:lstStyle/>
+          <a:p>
+            <a:pPr algn="ctr"/>
+            <a:r>
+              <a:rPr lang="en-US" dirty="0">
+                <a:solidFill>
+                  <a:schemeClr val="tx1"/>
+                </a:solidFill>
+              </a:rPr>
+              <a:t>Success</a:t>
+            </a:r>
+          </a:p>
+        </p:txBody>
+      </p:sp>
+      <p:sp>
+        <p:nvSpPr>
+          <p:cNvPr id="34" name="Rectangle 33"/>
+          <p:cNvSpPr/>
+          <p:nvPr/>
+        </p:nvSpPr>
+        <p:spPr>
+          <a:xfrm>
+            <a:off x="7553959" y="1225994"/>
+            <a:ext cx="1229360" cy="457200"/>
+          </a:xfrm>
+          <a:prstGeom prst="rect">
+            <a:avLst/>
+          </a:prstGeom>
+          <a:solidFill>
+            <a:srgbClr val="00B050"/>
+          </a:solidFill>
+          <a:ln w="28575">
+            <a:solidFill>
+              <a:schemeClr val="tx1"/>
+            </a:solidFill>
+          </a:ln>
+        </p:spPr>
+        <p:style>
+          <a:lnRef idx="2">
+            <a:schemeClr val="accent1">
+              <a:shade val="50000"/>
+            </a:schemeClr>
+          </a:lnRef>
+          <a:fillRef idx="1">
+            <a:schemeClr val="accent1"/>
+          </a:fillRef>
+          <a:effectRef idx="0">
+            <a:schemeClr val="accent1"/>
+          </a:effectRef>
+          <a:fontRef idx="minor">
+            <a:schemeClr val="lt1"/>
+          </a:fontRef>
+        </p:style>
+        <p:txBody>
+          <a:bodyPr rtlCol="0" anchor="ctr"/>
+          <a:lstStyle/>
+          <a:p>
+            <a:pPr algn="ctr"/>
+            <a:r>
+              <a:rPr lang="en-US" dirty="0">
+                <a:solidFill>
+                  <a:schemeClr val="tx1"/>
+                </a:solidFill>
+              </a:rPr>
+              <a:t>Success</a:t>
+            </a:r>
+          </a:p>
+        </p:txBody>
+      </p:sp>
+      <p:sp>
+        <p:nvSpPr>
+          <p:cNvPr id="35" name="Rectangle 34"/>
+          <p:cNvSpPr/>
+          <p:nvPr/>
+        </p:nvSpPr>
+        <p:spPr>
+          <a:xfrm>
+            <a:off x="7553959" y="2035619"/>
+            <a:ext cx="1229360" cy="457200"/>
+          </a:xfrm>
+          <a:prstGeom prst="rect">
+            <a:avLst/>
+          </a:prstGeom>
+          <a:solidFill>
+            <a:srgbClr val="FF0000"/>
+          </a:solidFill>
+          <a:ln w="28575">
+            <a:solidFill>
+              <a:schemeClr val="tx1"/>
+            </a:solidFill>
+          </a:ln>
+        </p:spPr>
+        <p:style>
+          <a:lnRef idx="2">
+            <a:schemeClr val="accent1">
+              <a:shade val="50000"/>
+            </a:schemeClr>
+          </a:lnRef>
+          <a:fillRef idx="1">
+            <a:schemeClr val="accent1"/>
+          </a:fillRef>
+          <a:effectRef idx="0">
+            <a:schemeClr val="accent1"/>
+          </a:effectRef>
+          <a:fontRef idx="minor">
+            <a:schemeClr val="lt1"/>
+          </a:fontRef>
+        </p:style>
+        <p:txBody>
+          <a:bodyPr rtlCol="0" anchor="ctr"/>
+          <a:lstStyle/>
+          <a:p>
+            <a:pPr algn="ctr"/>
+            <a:r>
+              <a:rPr lang="en-US" dirty="0">
+                <a:solidFill>
+                  <a:schemeClr val="tx1"/>
+                </a:solidFill>
+              </a:rPr>
+              <a:t>Failure</a:t>
+            </a:r>
+            <a:endParaRPr lang="en-US" dirty="0">
+              <a:solidFill>
+                <a:schemeClr val="tx1"/>
+              </a:solidFill>
+            </a:endParaRPr>
+          </a:p>
+        </p:txBody>
+      </p:sp>
+      <p:sp>
+        <p:nvSpPr>
+          <p:cNvPr id="36" name="Rectangle 35"/>
+          <p:cNvSpPr/>
+          <p:nvPr/>
+        </p:nvSpPr>
+        <p:spPr>
+          <a:xfrm>
+            <a:off x="7567929" y="2845244"/>
+            <a:ext cx="1229360" cy="457200"/>
+          </a:xfrm>
+          <a:prstGeom prst="rect">
+            <a:avLst/>
+          </a:prstGeom>
+          <a:solidFill>
+            <a:srgbClr val="00B050"/>
+          </a:solidFill>
+          <a:ln w="28575">
+            <a:solidFill>
+              <a:schemeClr val="tx1"/>
+            </a:solidFill>
+          </a:ln>
+        </p:spPr>
+        <p:style>
+          <a:lnRef idx="2">
+            <a:schemeClr val="accent1">
+              <a:shade val="50000"/>
+            </a:schemeClr>
+          </a:lnRef>
+          <a:fillRef idx="1">
+            <a:schemeClr val="accent1"/>
+          </a:fillRef>
+          <a:effectRef idx="0">
+            <a:schemeClr val="accent1"/>
+          </a:effectRef>
+          <a:fontRef idx="minor">
+            <a:schemeClr val="lt1"/>
+          </a:fontRef>
+        </p:style>
+        <p:txBody>
+          <a:bodyPr rtlCol="0" anchor="ctr"/>
+          <a:lstStyle/>
+          <a:p>
+            <a:pPr algn="ctr"/>
+            <a:r>
+              <a:rPr lang="en-US" dirty="0">
+                <a:solidFill>
+                  <a:schemeClr val="tx1"/>
+                </a:solidFill>
+              </a:rPr>
+              <a:t>Success</a:t>
+            </a:r>
+          </a:p>
+        </p:txBody>
+      </p:sp>
+      <p:sp>
+        <p:nvSpPr>
+          <p:cNvPr id="37" name="Right Brace 36"/>
+          <p:cNvSpPr/>
+          <p:nvPr/>
+        </p:nvSpPr>
+        <p:spPr>
+          <a:xfrm>
+            <a:off x="9055099" y="416369"/>
+            <a:ext cx="298450" cy="2886075"/>
+          </a:xfrm>
+          <a:prstGeom prst="rightBrace">
+            <a:avLst/>
+          </a:prstGeom>
+          <a:ln>
+            <a:solidFill>
+              <a:schemeClr val="tx1"/>
+            </a:solidFill>
+          </a:ln>
+        </p:spPr>
+        <p:style>
+          <a:lnRef idx="1">
+            <a:schemeClr val="accent1"/>
+          </a:lnRef>
+          <a:fillRef idx="0">
+            <a:schemeClr val="accent1"/>
+          </a:fillRef>
+          <a:effectRef idx="0">
+            <a:schemeClr val="accent1"/>
+          </a:effectRef>
+          <a:fontRef idx="minor">
+            <a:schemeClr val="tx1"/>
+          </a:fontRef>
+        </p:style>
+        <p:txBody>
+          <a:bodyPr rtlCol="0" anchor="ctr"/>
+          <a:lstStyle/>
+          <a:p>
+            <a:pPr algn="ctr"/>
+            <a:endParaRPr lang="en-US"/>
+          </a:p>
+        </p:txBody>
+      </p:sp>
+      <p:sp>
+        <p:nvSpPr>
+          <p:cNvPr id="38" name="Rectangle 37"/>
+          <p:cNvSpPr/>
+          <p:nvPr/>
+        </p:nvSpPr>
+        <p:spPr>
+          <a:xfrm>
+            <a:off x="9625329" y="1630806"/>
+            <a:ext cx="1229360" cy="457200"/>
+          </a:xfrm>
+          <a:prstGeom prst="rect">
+            <a:avLst/>
+          </a:prstGeom>
+          <a:solidFill>
+            <a:srgbClr val="FF0000"/>
+          </a:solidFill>
+          <a:ln w="28575">
+            <a:solidFill>
+              <a:schemeClr val="tx1"/>
+            </a:solidFill>
+          </a:ln>
+        </p:spPr>
+        <p:style>
+          <a:lnRef idx="2">
+            <a:schemeClr val="accent1">
+              <a:shade val="50000"/>
+            </a:schemeClr>
+          </a:lnRef>
+          <a:fillRef idx="1">
+            <a:schemeClr val="accent1"/>
+          </a:fillRef>
+          <a:effectRef idx="0">
+            <a:schemeClr val="accent1"/>
+          </a:effectRef>
+          <a:fontRef idx="minor">
+            <a:schemeClr val="lt1"/>
+          </a:fontRef>
+        </p:style>
+        <p:txBody>
+          <a:bodyPr rtlCol="0" anchor="ctr"/>
+          <a:lstStyle/>
+          <a:p>
+            <a:pPr algn="ctr"/>
+            <a:r>
+              <a:rPr lang="en-US" dirty="0" smtClean="0">
+                <a:solidFill>
+                  <a:schemeClr val="tx1"/>
+                </a:solidFill>
+              </a:rPr>
+              <a:t>Failure</a:t>
+            </a:r>
+            <a:endParaRPr lang="en-US" dirty="0">
+              <a:solidFill>
+                <a:schemeClr val="tx1"/>
+              </a:solidFill>
+            </a:endParaRPr>
+          </a:p>
+        </p:txBody>
+      </p:sp>
+    </p:spTree>
+    <p:extLst>
+      <p:ext uri="{BB962C8B-B14F-4D97-AF65-F5344CB8AC3E}">
+        <p14:creationId xmlns:p14="http://schemas.microsoft.com/office/powerpoint/2010/main" val="3879422711"/>
       </p:ext>
     </p:extLst>
   </p:cSld>

</xml_diff>